<commit_message>
actualizacion de la documentacion en base a los ultimos cambios del codigo
</commit_message>
<xml_diff>
--- a/docs/dise�o/diagramaArquitectura.pptx
+++ b/docs/dise�o/diagramaArquitectura.pptx
@@ -911,7 +911,7 @@
         <a:lstStyle/>
         <a:p>
           <a:r>
-            <a:rPr lang="es-AR" sz="2900" dirty="0" smtClean="0"/>
+            <a:rPr lang="es-AR" sz="2800" dirty="0" smtClean="0"/>
             <a:t>Entidades de Dominio</a:t>
           </a:r>
         </a:p>
@@ -928,7 +928,7 @@
             <a:rPr lang="es-AR" sz="2400" i="1" dirty="0" smtClean="0"/>
             <a:t>, Articulo, etc.)</a:t>
           </a:r>
-          <a:endParaRPr lang="es-AR" sz="2900" i="1" dirty="0"/>
+          <a:endParaRPr lang="es-AR" sz="2800" i="1" dirty="0"/>
         </a:p>
       </dgm:t>
     </dgm:pt>
@@ -939,7 +939,7 @@
         <a:bodyPr/>
         <a:lstStyle/>
         <a:p>
-          <a:endParaRPr lang="es-AR"/>
+          <a:endParaRPr lang="es-AR" sz="2000"/>
         </a:p>
       </dgm:t>
     </dgm:pt>
@@ -950,22 +950,22 @@
         <a:bodyPr/>
         <a:lstStyle/>
         <a:p>
-          <a:endParaRPr lang="es-AR"/>
+          <a:endParaRPr lang="es-AR" sz="2000"/>
         </a:p>
       </dgm:t>
     </dgm:pt>
     <dgm:pt modelId="{2E2CC210-63D3-4B90-AAB8-7842DC1ACF6A}">
-      <dgm:prSet phldrT="[Text]"/>
+      <dgm:prSet phldrT="[Text]" custT="1"/>
       <dgm:spPr/>
       <dgm:t>
         <a:bodyPr/>
         <a:lstStyle/>
         <a:p>
           <a:r>
-            <a:rPr lang="es-AR" dirty="0" err="1" smtClean="0"/>
+            <a:rPr lang="es-AR" sz="2000" dirty="0" err="1" smtClean="0"/>
             <a:t>despacho.backend</a:t>
           </a:r>
-          <a:endParaRPr lang="es-AR" dirty="0"/>
+          <a:endParaRPr lang="es-AR" sz="2000" dirty="0"/>
         </a:p>
       </dgm:t>
     </dgm:pt>
@@ -976,7 +976,7 @@
         <a:bodyPr/>
         <a:lstStyle/>
         <a:p>
-          <a:endParaRPr lang="es-AR"/>
+          <a:endParaRPr lang="es-AR" sz="2000"/>
         </a:p>
       </dgm:t>
     </dgm:pt>
@@ -987,52 +987,52 @@
         <a:bodyPr/>
         <a:lstStyle/>
         <a:p>
-          <a:endParaRPr lang="es-AR"/>
+          <a:endParaRPr lang="es-AR" sz="2000"/>
         </a:p>
       </dgm:t>
     </dgm:pt>
     <dgm:pt modelId="{2CA60DA4-B62B-44AC-8281-22EFE8F6FFA9}">
-      <dgm:prSet phldrT="[Text]"/>
+      <dgm:prSet phldrT="[Text]" custT="1"/>
       <dgm:spPr/>
       <dgm:t>
         <a:bodyPr/>
         <a:lstStyle/>
         <a:p>
           <a:r>
-            <a:rPr lang="es-AR" b="1" dirty="0" smtClean="0"/>
+            <a:rPr lang="es-AR" sz="1400" b="1" dirty="0" smtClean="0"/>
             <a:t>servicios</a:t>
           </a:r>
         </a:p>
         <a:p>
           <a:r>
-            <a:rPr lang="es-AR" dirty="0" smtClean="0"/>
+            <a:rPr lang="es-AR" sz="1400" dirty="0" smtClean="0"/>
             <a:t>(</a:t>
           </a:r>
           <a:r>
-            <a:rPr lang="es-AR" dirty="0" err="1" smtClean="0"/>
+            <a:rPr lang="es-AR" sz="1400" dirty="0" err="1" smtClean="0"/>
             <a:t>session</a:t>
           </a:r>
           <a:r>
-            <a:rPr lang="es-AR" dirty="0" smtClean="0"/>
+            <a:rPr lang="es-AR" sz="1400" dirty="0" smtClean="0"/>
             <a:t> </a:t>
           </a:r>
           <a:r>
-            <a:rPr lang="es-AR" dirty="0" err="1" smtClean="0"/>
+            <a:rPr lang="es-AR" sz="1400" dirty="0" err="1" smtClean="0"/>
             <a:t>beans</a:t>
           </a:r>
           <a:r>
-            <a:rPr lang="es-AR" dirty="0" smtClean="0"/>
+            <a:rPr lang="es-AR" sz="1400" dirty="0" smtClean="0"/>
             <a:t> </a:t>
           </a:r>
           <a:r>
-            <a:rPr lang="es-AR" dirty="0" err="1" smtClean="0"/>
+            <a:rPr lang="es-AR" sz="1400" dirty="0" err="1" smtClean="0"/>
             <a:t>facade</a:t>
           </a:r>
           <a:r>
-            <a:rPr lang="es-AR" dirty="0" smtClean="0"/>
+            <a:rPr lang="es-AR" sz="1400" dirty="0" smtClean="0"/>
             <a:t>)</a:t>
           </a:r>
-          <a:endParaRPr lang="es-AR" dirty="0"/>
+          <a:endParaRPr lang="es-AR" sz="1400" dirty="0"/>
         </a:p>
       </dgm:t>
     </dgm:pt>
@@ -1043,7 +1043,7 @@
         <a:bodyPr/>
         <a:lstStyle/>
         <a:p>
-          <a:endParaRPr lang="es-AR"/>
+          <a:endParaRPr lang="es-AR" sz="2000"/>
         </a:p>
       </dgm:t>
     </dgm:pt>
@@ -1054,60 +1054,60 @@
         <a:bodyPr/>
         <a:lstStyle/>
         <a:p>
-          <a:endParaRPr lang="es-AR"/>
+          <a:endParaRPr lang="es-AR" sz="2000"/>
         </a:p>
       </dgm:t>
     </dgm:pt>
     <dgm:pt modelId="{EBA3E750-9C02-4C9A-9FB5-167B90B55A46}">
-      <dgm:prSet phldrT="[Text]"/>
+      <dgm:prSet phldrT="[Text]" custT="1"/>
       <dgm:spPr/>
       <dgm:t>
         <a:bodyPr/>
         <a:lstStyle/>
         <a:p>
           <a:r>
-            <a:rPr lang="es-AR" b="1" dirty="0" smtClean="0"/>
+            <a:rPr lang="es-AR" sz="1400" b="1" dirty="0" smtClean="0"/>
             <a:t>administradores</a:t>
           </a:r>
         </a:p>
         <a:p>
           <a:r>
-            <a:rPr lang="es-AR" dirty="0" smtClean="0"/>
+            <a:rPr lang="es-AR" sz="1400" dirty="0" smtClean="0"/>
             <a:t>(</a:t>
           </a:r>
           <a:r>
-            <a:rPr lang="es-AR" dirty="0" err="1" smtClean="0"/>
+            <a:rPr lang="es-AR" sz="1400" dirty="0" err="1" smtClean="0"/>
             <a:t>session</a:t>
           </a:r>
           <a:r>
-            <a:rPr lang="es-AR" dirty="0" smtClean="0"/>
+            <a:rPr lang="es-AR" sz="1400" dirty="0" smtClean="0"/>
             <a:t> </a:t>
           </a:r>
           <a:r>
-            <a:rPr lang="es-AR" dirty="0" err="1" smtClean="0"/>
+            <a:rPr lang="es-AR" sz="1400" dirty="0" err="1" smtClean="0"/>
             <a:t>beans</a:t>
           </a:r>
           <a:r>
-            <a:rPr lang="es-AR" dirty="0" smtClean="0"/>
+            <a:rPr lang="es-AR" sz="1400" dirty="0" smtClean="0"/>
             <a:t>, </a:t>
           </a:r>
           <a:r>
-            <a:rPr lang="es-AR" dirty="0" err="1" smtClean="0"/>
+            <a:rPr lang="es-AR" sz="1400" dirty="0" err="1" smtClean="0"/>
             <a:t>message-driven</a:t>
           </a:r>
           <a:r>
-            <a:rPr lang="es-AR" dirty="0" smtClean="0"/>
+            <a:rPr lang="es-AR" sz="1400" dirty="0" smtClean="0"/>
             <a:t> </a:t>
           </a:r>
           <a:r>
-            <a:rPr lang="es-AR" dirty="0" err="1" smtClean="0"/>
+            <a:rPr lang="es-AR" sz="1400" dirty="0" err="1" smtClean="0"/>
             <a:t>beans</a:t>
           </a:r>
           <a:r>
-            <a:rPr lang="es-AR" dirty="0" smtClean="0"/>
+            <a:rPr lang="es-AR" sz="1400" dirty="0" smtClean="0"/>
             <a:t>)</a:t>
           </a:r>
-          <a:endParaRPr lang="es-AR" dirty="0"/>
+          <a:endParaRPr lang="es-AR" sz="1400" dirty="0"/>
         </a:p>
       </dgm:t>
     </dgm:pt>
@@ -1118,7 +1118,7 @@
         <a:bodyPr/>
         <a:lstStyle/>
         <a:p>
-          <a:endParaRPr lang="es-AR"/>
+          <a:endParaRPr lang="es-AR" sz="2000"/>
         </a:p>
       </dgm:t>
     </dgm:pt>
@@ -1129,22 +1129,22 @@
         <a:bodyPr/>
         <a:lstStyle/>
         <a:p>
-          <a:endParaRPr lang="es-AR"/>
+          <a:endParaRPr lang="es-AR" sz="2000"/>
         </a:p>
       </dgm:t>
     </dgm:pt>
     <dgm:pt modelId="{3D2ACBF5-F895-435F-8B0D-3BFB52483093}">
-      <dgm:prSet phldrT="[Text]"/>
+      <dgm:prSet phldrT="[Text]" custT="1"/>
       <dgm:spPr/>
       <dgm:t>
         <a:bodyPr/>
         <a:lstStyle/>
         <a:p>
           <a:r>
-            <a:rPr lang="es-AR" dirty="0" err="1" smtClean="0"/>
+            <a:rPr lang="es-AR" sz="2000" dirty="0" err="1" smtClean="0"/>
             <a:t>despacho.web</a:t>
           </a:r>
-          <a:endParaRPr lang="es-AR" dirty="0"/>
+          <a:endParaRPr lang="es-AR" sz="2000" dirty="0"/>
         </a:p>
       </dgm:t>
     </dgm:pt>
@@ -1155,7 +1155,7 @@
         <a:bodyPr/>
         <a:lstStyle/>
         <a:p>
-          <a:endParaRPr lang="es-AR"/>
+          <a:endParaRPr lang="es-AR" sz="2000"/>
         </a:p>
       </dgm:t>
     </dgm:pt>
@@ -1166,30 +1166,138 @@
         <a:bodyPr/>
         <a:lstStyle/>
         <a:p>
-          <a:endParaRPr lang="es-AR"/>
+          <a:endParaRPr lang="es-AR" sz="2000"/>
         </a:p>
       </dgm:t>
     </dgm:pt>
-    <dgm:pt modelId="{13789B58-14C3-4D26-B259-51AC0AE6C5B5}">
-      <dgm:prSet phldrT="[Text]"/>
+    <dgm:pt modelId="{F3A1C553-D1F5-4459-9877-D0B4040A942F}">
+      <dgm:prSet phldrT="[Text]" custT="1"/>
       <dgm:spPr/>
       <dgm:t>
         <a:bodyPr/>
         <a:lstStyle/>
         <a:p>
           <a:r>
-            <a:rPr lang="es-AR" b="1" dirty="0" err="1" smtClean="0"/>
+            <a:rPr lang="es-AR" sz="1400" b="1" dirty="0" smtClean="0"/>
+            <a:t>BackOffice</a:t>
+          </a:r>
+        </a:p>
+        <a:p>
+          <a:r>
+            <a:rPr lang="es-AR" sz="1400" dirty="0" smtClean="0"/>
+            <a:t>(MVC </a:t>
+          </a:r>
+          <a:r>
+            <a:rPr lang="es-AR" sz="1400" dirty="0" err="1" smtClean="0"/>
+            <a:t>controllers</a:t>
+          </a:r>
+          <a:r>
+            <a:rPr lang="es-AR" sz="1400" dirty="0" smtClean="0"/>
+            <a:t>, </a:t>
+          </a:r>
+          <a:r>
+            <a:rPr lang="es-AR" sz="1400" dirty="0" err="1" smtClean="0"/>
+            <a:t>html</a:t>
+          </a:r>
+          <a:r>
+            <a:rPr lang="es-AR" sz="1400" dirty="0" smtClean="0"/>
+            <a:t>, </a:t>
+          </a:r>
+          <a:r>
+            <a:rPr lang="es-AR" sz="1400" dirty="0" err="1" smtClean="0"/>
+            <a:t>js</a:t>
+          </a:r>
+          <a:r>
+            <a:rPr lang="es-AR" sz="1400" dirty="0" smtClean="0"/>
+            <a:t>, etc.)</a:t>
+          </a:r>
+          <a:endParaRPr lang="es-AR" sz="1400" dirty="0"/>
+        </a:p>
+      </dgm:t>
+    </dgm:pt>
+    <dgm:pt modelId="{1425EAE0-4A8B-43AD-94CB-06BE862D0E02}" type="parTrans" cxnId="{C1B1A6BA-2C58-4044-9022-4FACEE0A5CEB}">
+      <dgm:prSet/>
+      <dgm:spPr/>
+      <dgm:t>
+        <a:bodyPr/>
+        <a:lstStyle/>
+        <a:p>
+          <a:endParaRPr lang="es-AR" sz="2000"/>
+        </a:p>
+      </dgm:t>
+    </dgm:pt>
+    <dgm:pt modelId="{AD04BA91-EAEE-42B1-B10D-479545F942C2}" type="sibTrans" cxnId="{C1B1A6BA-2C58-4044-9022-4FACEE0A5CEB}">
+      <dgm:prSet/>
+      <dgm:spPr/>
+      <dgm:t>
+        <a:bodyPr/>
+        <a:lstStyle/>
+        <a:p>
+          <a:endParaRPr lang="es-AR" sz="2000"/>
+        </a:p>
+      </dgm:t>
+    </dgm:pt>
+    <dgm:pt modelId="{186E8C33-650E-44F0-8D93-2CA3816E561F}">
+      <dgm:prSet phldrT="[Text]" custT="1"/>
+      <dgm:spPr/>
+      <dgm:t>
+        <a:bodyPr/>
+        <a:lstStyle/>
+        <a:p>
+          <a:r>
+            <a:rPr lang="es-AR" sz="2000" dirty="0" err="1" smtClean="0"/>
+            <a:t>despacho.backend.api</a:t>
+          </a:r>
+          <a:endParaRPr lang="es-AR" sz="2000" dirty="0"/>
+        </a:p>
+      </dgm:t>
+    </dgm:pt>
+    <dgm:pt modelId="{1C9090E9-E253-425C-97C8-854A16974FC4}" type="parTrans" cxnId="{56205118-3548-4FAF-A22D-A862D594425D}">
+      <dgm:prSet/>
+      <dgm:spPr/>
+      <dgm:t>
+        <a:bodyPr/>
+        <a:lstStyle/>
+        <a:p>
+          <a:endParaRPr lang="es-AR" sz="2000"/>
+        </a:p>
+      </dgm:t>
+    </dgm:pt>
+    <dgm:pt modelId="{D1299C69-B213-4DEF-9C0B-15D5FC0C921A}" type="sibTrans" cxnId="{56205118-3548-4FAF-A22D-A862D594425D}">
+      <dgm:prSet/>
+      <dgm:spPr/>
+      <dgm:t>
+        <a:bodyPr/>
+        <a:lstStyle/>
+        <a:p>
+          <a:endParaRPr lang="es-AR" sz="2000"/>
+        </a:p>
+      </dgm:t>
+    </dgm:pt>
+    <dgm:pt modelId="{D38DDA5E-167A-4E26-94E7-9F622D3CA701}">
+      <dgm:prSet phldrT="[Text]" custT="1"/>
+      <dgm:spPr/>
+      <dgm:t>
+        <a:bodyPr/>
+        <a:lstStyle/>
+        <a:p>
+          <a:r>
+            <a:rPr lang="es-AR" sz="1400" b="1" dirty="0" err="1" smtClean="0"/>
             <a:t>Endpoints</a:t>
           </a:r>
           <a:r>
-            <a:rPr lang="es-AR" b="1" dirty="0" smtClean="0"/>
+            <a:rPr lang="es-AR" sz="1400" b="1" dirty="0" smtClean="0"/>
             <a:t> REST</a:t>
           </a:r>
-          <a:endParaRPr lang="es-AR" b="1" dirty="0"/>
+          <a:r>
+            <a:rPr lang="es-AR" sz="1400" dirty="0" smtClean="0"/>
+            <a:t> (JSON)</a:t>
+          </a:r>
+          <a:endParaRPr lang="es-AR" sz="1400" dirty="0"/>
         </a:p>
       </dgm:t>
     </dgm:pt>
-    <dgm:pt modelId="{D35FFC3F-63D0-438B-B45E-9EE7E875C6B6}" type="parTrans" cxnId="{8E9C31E9-487A-4C5F-B680-21A6D1A23727}">
+    <dgm:pt modelId="{C4DE24AF-16F4-4DE5-87F6-ED69602DBBD1}" type="parTrans" cxnId="{9068D12E-6457-4475-907F-C0D05DA82176}">
       <dgm:prSet/>
       <dgm:spPr/>
       <dgm:t>
@@ -1200,74 +1308,7 @@
         </a:p>
       </dgm:t>
     </dgm:pt>
-    <dgm:pt modelId="{7B82688E-A779-4BE4-984F-CCF05CC1371C}" type="sibTrans" cxnId="{8E9C31E9-487A-4C5F-B680-21A6D1A23727}">
-      <dgm:prSet/>
-      <dgm:spPr/>
-      <dgm:t>
-        <a:bodyPr/>
-        <a:lstStyle/>
-        <a:p>
-          <a:endParaRPr lang="es-AR"/>
-        </a:p>
-      </dgm:t>
-    </dgm:pt>
-    <dgm:pt modelId="{F3A1C553-D1F5-4459-9877-D0B4040A942F}">
-      <dgm:prSet phldrT="[Text]"/>
-      <dgm:spPr/>
-      <dgm:t>
-        <a:bodyPr/>
-        <a:lstStyle/>
-        <a:p>
-          <a:r>
-            <a:rPr lang="es-AR" b="1" dirty="0" smtClean="0"/>
-            <a:t>BackOffice</a:t>
-          </a:r>
-        </a:p>
-        <a:p>
-          <a:r>
-            <a:rPr lang="es-AR" dirty="0" smtClean="0"/>
-            <a:t>(MVC </a:t>
-          </a:r>
-          <a:r>
-            <a:rPr lang="es-AR" dirty="0" err="1" smtClean="0"/>
-            <a:t>controllers</a:t>
-          </a:r>
-          <a:r>
-            <a:rPr lang="es-AR" dirty="0" smtClean="0"/>
-            <a:t>, </a:t>
-          </a:r>
-          <a:r>
-            <a:rPr lang="es-AR" dirty="0" err="1" smtClean="0"/>
-            <a:t>html</a:t>
-          </a:r>
-          <a:r>
-            <a:rPr lang="es-AR" dirty="0" smtClean="0"/>
-            <a:t>, </a:t>
-          </a:r>
-          <a:r>
-            <a:rPr lang="es-AR" dirty="0" err="1" smtClean="0"/>
-            <a:t>js</a:t>
-          </a:r>
-          <a:r>
-            <a:rPr lang="es-AR" dirty="0" smtClean="0"/>
-            <a:t>, etc.)</a:t>
-          </a:r>
-          <a:endParaRPr lang="es-AR" dirty="0"/>
-        </a:p>
-      </dgm:t>
-    </dgm:pt>
-    <dgm:pt modelId="{1425EAE0-4A8B-43AD-94CB-06BE862D0E02}" type="parTrans" cxnId="{C1B1A6BA-2C58-4044-9022-4FACEE0A5CEB}">
-      <dgm:prSet/>
-      <dgm:spPr/>
-      <dgm:t>
-        <a:bodyPr/>
-        <a:lstStyle/>
-        <a:p>
-          <a:endParaRPr lang="es-AR"/>
-        </a:p>
-      </dgm:t>
-    </dgm:pt>
-    <dgm:pt modelId="{AD04BA91-EAEE-42B1-B10D-479545F942C2}" type="sibTrans" cxnId="{C1B1A6BA-2C58-4044-9022-4FACEE0A5CEB}">
+    <dgm:pt modelId="{872360CC-4058-433A-8D36-CB66814E666E}" type="sibTrans" cxnId="{9068D12E-6457-4475-907F-C0D05DA82176}">
       <dgm:prSet/>
       <dgm:spPr/>
       <dgm:t>
@@ -1289,6 +1330,13 @@
         </dgm:presLayoutVars>
       </dgm:prSet>
       <dgm:spPr/>
+      <dgm:t>
+        <a:bodyPr/>
+        <a:lstStyle/>
+        <a:p>
+          <a:endParaRPr lang="es-AR"/>
+        </a:p>
+      </dgm:t>
     </dgm:pt>
     <dgm:pt modelId="{4D8746FF-4C71-4726-80A1-AB0D28A035C4}" type="pres">
       <dgm:prSet presAssocID="{8132AD04-3B58-4986-8202-76FE1F021998}" presName="vertOne" presStyleCnt="0"/>
@@ -1322,7 +1370,7 @@
       <dgm:spPr/>
     </dgm:pt>
     <dgm:pt modelId="{2414CDC9-2921-4E2E-9070-CB98C834D0AC}" type="pres">
-      <dgm:prSet presAssocID="{2E2CC210-63D3-4B90-AAB8-7842DC1ACF6A}" presName="txTwo" presStyleLbl="node2" presStyleIdx="0" presStyleCnt="2">
+      <dgm:prSet presAssocID="{2E2CC210-63D3-4B90-AAB8-7842DC1ACF6A}" presName="txTwo" presStyleLbl="node2" presStyleIdx="0" presStyleCnt="3">
         <dgm:presLayoutVars>
           <dgm:chPref val="3"/>
         </dgm:presLayoutVars>
@@ -1398,12 +1446,66 @@
       <dgm:prSet presAssocID="{5A1345CB-7A71-49FC-A8AD-847A4E73DC5A}" presName="sibSpaceTwo" presStyleCnt="0"/>
       <dgm:spPr/>
     </dgm:pt>
+    <dgm:pt modelId="{71F6344C-7942-4C96-B11B-5786C7AC3AC6}" type="pres">
+      <dgm:prSet presAssocID="{186E8C33-650E-44F0-8D93-2CA3816E561F}" presName="vertTwo" presStyleCnt="0"/>
+      <dgm:spPr/>
+    </dgm:pt>
+    <dgm:pt modelId="{94084C15-33BE-47D4-9D1F-59A8BD253503}" type="pres">
+      <dgm:prSet presAssocID="{186E8C33-650E-44F0-8D93-2CA3816E561F}" presName="txTwo" presStyleLbl="node2" presStyleIdx="1" presStyleCnt="3">
+        <dgm:presLayoutVars>
+          <dgm:chPref val="3"/>
+        </dgm:presLayoutVars>
+      </dgm:prSet>
+      <dgm:spPr/>
+      <dgm:t>
+        <a:bodyPr/>
+        <a:lstStyle/>
+        <a:p>
+          <a:endParaRPr lang="es-AR"/>
+        </a:p>
+      </dgm:t>
+    </dgm:pt>
+    <dgm:pt modelId="{1DC0564F-23CF-410B-9ECB-56BC4B6E9788}" type="pres">
+      <dgm:prSet presAssocID="{186E8C33-650E-44F0-8D93-2CA3816E561F}" presName="parTransTwo" presStyleCnt="0"/>
+      <dgm:spPr/>
+    </dgm:pt>
+    <dgm:pt modelId="{02155996-73FE-4D00-802D-651100894C97}" type="pres">
+      <dgm:prSet presAssocID="{186E8C33-650E-44F0-8D93-2CA3816E561F}" presName="horzTwo" presStyleCnt="0"/>
+      <dgm:spPr/>
+    </dgm:pt>
+    <dgm:pt modelId="{8369BBC2-E5D2-4760-BED9-FA7CA2BA7958}" type="pres">
+      <dgm:prSet presAssocID="{D38DDA5E-167A-4E26-94E7-9F622D3CA701}" presName="vertThree" presStyleCnt="0"/>
+      <dgm:spPr/>
+    </dgm:pt>
+    <dgm:pt modelId="{52CE305C-9711-4896-B4DA-5A91D003F4E3}" type="pres">
+      <dgm:prSet presAssocID="{D38DDA5E-167A-4E26-94E7-9F622D3CA701}" presName="txThree" presStyleLbl="node3" presStyleIdx="2" presStyleCnt="4">
+        <dgm:presLayoutVars>
+          <dgm:chPref val="3"/>
+        </dgm:presLayoutVars>
+      </dgm:prSet>
+      <dgm:spPr/>
+      <dgm:t>
+        <a:bodyPr/>
+        <a:lstStyle/>
+        <a:p>
+          <a:endParaRPr lang="es-AR"/>
+        </a:p>
+      </dgm:t>
+    </dgm:pt>
+    <dgm:pt modelId="{FC7F97A3-DB29-4EAB-BED9-1C2AFE0EAB47}" type="pres">
+      <dgm:prSet presAssocID="{D38DDA5E-167A-4E26-94E7-9F622D3CA701}" presName="horzThree" presStyleCnt="0"/>
+      <dgm:spPr/>
+    </dgm:pt>
+    <dgm:pt modelId="{CA0985F6-2789-470C-9DD8-2901164088D8}" type="pres">
+      <dgm:prSet presAssocID="{D1299C69-B213-4DEF-9C0B-15D5FC0C921A}" presName="sibSpaceTwo" presStyleCnt="0"/>
+      <dgm:spPr/>
+    </dgm:pt>
     <dgm:pt modelId="{7F27A5FD-ABBA-4E9E-9ED7-F1DFB7DA1C8B}" type="pres">
       <dgm:prSet presAssocID="{3D2ACBF5-F895-435F-8B0D-3BFB52483093}" presName="vertTwo" presStyleCnt="0"/>
       <dgm:spPr/>
     </dgm:pt>
     <dgm:pt modelId="{258044DB-E7CF-4021-8E8A-D08D977E6DAE}" type="pres">
-      <dgm:prSet presAssocID="{3D2ACBF5-F895-435F-8B0D-3BFB52483093}" presName="txTwo" presStyleLbl="node2" presStyleIdx="1" presStyleCnt="2">
+      <dgm:prSet presAssocID="{3D2ACBF5-F895-435F-8B0D-3BFB52483093}" presName="txTwo" presStyleLbl="node2" presStyleIdx="2" presStyleCnt="3">
         <dgm:presLayoutVars>
           <dgm:chPref val="3"/>
         </dgm:presLayoutVars>
@@ -1423,33 +1525,6 @@
     </dgm:pt>
     <dgm:pt modelId="{640864CA-ACA8-4228-ACA0-D808EA6C4F3A}" type="pres">
       <dgm:prSet presAssocID="{3D2ACBF5-F895-435F-8B0D-3BFB52483093}" presName="horzTwo" presStyleCnt="0"/>
-      <dgm:spPr/>
-    </dgm:pt>
-    <dgm:pt modelId="{E919F72D-E800-4404-9E84-2C747B681947}" type="pres">
-      <dgm:prSet presAssocID="{13789B58-14C3-4D26-B259-51AC0AE6C5B5}" presName="vertThree" presStyleCnt="0"/>
-      <dgm:spPr/>
-    </dgm:pt>
-    <dgm:pt modelId="{32C3FE91-8E77-40CC-AE92-C90F7E86F33A}" type="pres">
-      <dgm:prSet presAssocID="{13789B58-14C3-4D26-B259-51AC0AE6C5B5}" presName="txThree" presStyleLbl="node3" presStyleIdx="2" presStyleCnt="4">
-        <dgm:presLayoutVars>
-          <dgm:chPref val="3"/>
-        </dgm:presLayoutVars>
-      </dgm:prSet>
-      <dgm:spPr/>
-      <dgm:t>
-        <a:bodyPr/>
-        <a:lstStyle/>
-        <a:p>
-          <a:endParaRPr lang="es-AR"/>
-        </a:p>
-      </dgm:t>
-    </dgm:pt>
-    <dgm:pt modelId="{31CF5BE0-CCF3-46C1-BA02-BB7EDBF3B423}" type="pres">
-      <dgm:prSet presAssocID="{13789B58-14C3-4D26-B259-51AC0AE6C5B5}" presName="horzThree" presStyleCnt="0"/>
-      <dgm:spPr/>
-    </dgm:pt>
-    <dgm:pt modelId="{5AF86458-B0CB-45CA-9F5B-849A2F5D0D76}" type="pres">
-      <dgm:prSet presAssocID="{7B82688E-A779-4BE4-984F-CCF05CC1371C}" presName="sibSpaceThree" presStyleCnt="0"/>
       <dgm:spPr/>
     </dgm:pt>
     <dgm:pt modelId="{FAB6C358-62FF-4E59-B8D7-85F3882283CD}" type="pres">
@@ -1477,21 +1552,23 @@
     </dgm:pt>
   </dgm:ptLst>
   <dgm:cxnLst>
-    <dgm:cxn modelId="{A7A5547C-A857-42E8-9E3A-061F88B32B84}" srcId="{8132AD04-3B58-4986-8202-76FE1F021998}" destId="{3D2ACBF5-F895-435F-8B0D-3BFB52483093}" srcOrd="1" destOrd="0" parTransId="{5D95ED6B-3176-405C-A6EF-A6085F65E845}" sibTransId="{3A3DFEE2-BAE0-43F7-BA46-36C26AC410C5}"/>
+    <dgm:cxn modelId="{62918FE3-E699-4D9F-9B03-A51B81868E0A}" srcId="{CC4D3327-6D1C-4B10-BC36-95757644B5BA}" destId="{8132AD04-3B58-4986-8202-76FE1F021998}" srcOrd="0" destOrd="0" parTransId="{FB0691DA-C737-4893-A94A-5C8F5F8DC78F}" sibTransId="{0B66A5F2-B95F-4CE1-B33E-55CAACB1784F}"/>
+    <dgm:cxn modelId="{0531DC65-665E-40D8-8BDA-780C8C1F0FD8}" type="presOf" srcId="{D38DDA5E-167A-4E26-94E7-9F622D3CA701}" destId="{52CE305C-9711-4896-B4DA-5A91D003F4E3}" srcOrd="0" destOrd="0" presId="urn:microsoft.com/office/officeart/2005/8/layout/hierarchy4"/>
+    <dgm:cxn modelId="{9068D12E-6457-4475-907F-C0D05DA82176}" srcId="{186E8C33-650E-44F0-8D93-2CA3816E561F}" destId="{D38DDA5E-167A-4E26-94E7-9F622D3CA701}" srcOrd="0" destOrd="0" parTransId="{C4DE24AF-16F4-4DE5-87F6-ED69602DBBD1}" sibTransId="{872360CC-4058-433A-8D36-CB66814E666E}"/>
+    <dgm:cxn modelId="{4CD294C6-E2E8-4110-98D3-E7B8B6D8A8F4}" type="presOf" srcId="{CC4D3327-6D1C-4B10-BC36-95757644B5BA}" destId="{0B6E454E-EE7F-4039-A988-6D6C21FA1287}" srcOrd="0" destOrd="0" presId="urn:microsoft.com/office/officeart/2005/8/layout/hierarchy4"/>
+    <dgm:cxn modelId="{C1B1A6BA-2C58-4044-9022-4FACEE0A5CEB}" srcId="{3D2ACBF5-F895-435F-8B0D-3BFB52483093}" destId="{F3A1C553-D1F5-4459-9877-D0B4040A942F}" srcOrd="0" destOrd="0" parTransId="{1425EAE0-4A8B-43AD-94CB-06BE862D0E02}" sibTransId="{AD04BA91-EAEE-42B1-B10D-479545F942C2}"/>
+    <dgm:cxn modelId="{B202CA5C-0FF5-411D-B660-410BF32B635D}" type="presOf" srcId="{2CA60DA4-B62B-44AC-8281-22EFE8F6FFA9}" destId="{FC682755-238F-42BD-B24F-5A4B1AD1977B}" srcOrd="0" destOrd="0" presId="urn:microsoft.com/office/officeart/2005/8/layout/hierarchy4"/>
+    <dgm:cxn modelId="{86CBDE9E-52D3-4977-AFB0-AC709336B22B}" type="presOf" srcId="{2E2CC210-63D3-4B90-AAB8-7842DC1ACF6A}" destId="{2414CDC9-2921-4E2E-9070-CB98C834D0AC}" srcOrd="0" destOrd="0" presId="urn:microsoft.com/office/officeart/2005/8/layout/hierarchy4"/>
+    <dgm:cxn modelId="{7D45F58A-7CF1-4B04-8696-DAC5F2172FC7}" type="presOf" srcId="{3D2ACBF5-F895-435F-8B0D-3BFB52483093}" destId="{258044DB-E7CF-4021-8E8A-D08D977E6DAE}" srcOrd="0" destOrd="0" presId="urn:microsoft.com/office/officeart/2005/8/layout/hierarchy4"/>
+    <dgm:cxn modelId="{86A42220-342C-4DB7-96DC-B53F849509A0}" type="presOf" srcId="{F3A1C553-D1F5-4459-9877-D0B4040A942F}" destId="{187FEF15-EBD5-464D-9B77-65AF8814271C}" srcOrd="0" destOrd="0" presId="urn:microsoft.com/office/officeart/2005/8/layout/hierarchy4"/>
+    <dgm:cxn modelId="{67E7B484-9983-46C3-91A6-FAF582152578}" srcId="{2E2CC210-63D3-4B90-AAB8-7842DC1ACF6A}" destId="{2CA60DA4-B62B-44AC-8281-22EFE8F6FFA9}" srcOrd="0" destOrd="0" parTransId="{85A89A3C-A2CB-46EE-9C5A-74BF445568EE}" sibTransId="{B03B81A3-9454-4A29-BA23-6B547BA5D9BA}"/>
+    <dgm:cxn modelId="{A105A6C0-812E-4A65-AD38-91B09A99446C}" srcId="{2E2CC210-63D3-4B90-AAB8-7842DC1ACF6A}" destId="{EBA3E750-9C02-4C9A-9FB5-167B90B55A46}" srcOrd="1" destOrd="0" parTransId="{D3364096-3CD3-4DA5-A0C8-4A42280765AF}" sibTransId="{DADCB130-B4BF-43E0-8744-589B7798140C}"/>
+    <dgm:cxn modelId="{C931CDB8-CF78-48E9-8C67-29BD39B696F4}" type="presOf" srcId="{186E8C33-650E-44F0-8D93-2CA3816E561F}" destId="{94084C15-33BE-47D4-9D1F-59A8BD253503}" srcOrd="0" destOrd="0" presId="urn:microsoft.com/office/officeart/2005/8/layout/hierarchy4"/>
+    <dgm:cxn modelId="{CB4AB731-C79F-4CDB-90E1-AF81C0715B85}" type="presOf" srcId="{EBA3E750-9C02-4C9A-9FB5-167B90B55A46}" destId="{FE90592A-AD0A-422B-A991-F80FBA8C7C4B}" srcOrd="0" destOrd="0" presId="urn:microsoft.com/office/officeart/2005/8/layout/hierarchy4"/>
     <dgm:cxn modelId="{7EF62486-6F16-4605-B12D-C00093244AE7}" type="presOf" srcId="{8132AD04-3B58-4986-8202-76FE1F021998}" destId="{933F7C83-77B2-4FB5-9F91-493A35E5D989}" srcOrd="0" destOrd="0" presId="urn:microsoft.com/office/officeart/2005/8/layout/hierarchy4"/>
-    <dgm:cxn modelId="{B202CA5C-0FF5-411D-B660-410BF32B635D}" type="presOf" srcId="{2CA60DA4-B62B-44AC-8281-22EFE8F6FFA9}" destId="{FC682755-238F-42BD-B24F-5A4B1AD1977B}" srcOrd="0" destOrd="0" presId="urn:microsoft.com/office/officeart/2005/8/layout/hierarchy4"/>
-    <dgm:cxn modelId="{C1B1A6BA-2C58-4044-9022-4FACEE0A5CEB}" srcId="{3D2ACBF5-F895-435F-8B0D-3BFB52483093}" destId="{F3A1C553-D1F5-4459-9877-D0B4040A942F}" srcOrd="1" destOrd="0" parTransId="{1425EAE0-4A8B-43AD-94CB-06BE862D0E02}" sibTransId="{AD04BA91-EAEE-42B1-B10D-479545F942C2}"/>
-    <dgm:cxn modelId="{7D45F58A-7CF1-4B04-8696-DAC5F2172FC7}" type="presOf" srcId="{3D2ACBF5-F895-435F-8B0D-3BFB52483093}" destId="{258044DB-E7CF-4021-8E8A-D08D977E6DAE}" srcOrd="0" destOrd="0" presId="urn:microsoft.com/office/officeart/2005/8/layout/hierarchy4"/>
-    <dgm:cxn modelId="{4CD294C6-E2E8-4110-98D3-E7B8B6D8A8F4}" type="presOf" srcId="{CC4D3327-6D1C-4B10-BC36-95757644B5BA}" destId="{0B6E454E-EE7F-4039-A988-6D6C21FA1287}" srcOrd="0" destOrd="0" presId="urn:microsoft.com/office/officeart/2005/8/layout/hierarchy4"/>
-    <dgm:cxn modelId="{86A42220-342C-4DB7-96DC-B53F849509A0}" type="presOf" srcId="{F3A1C553-D1F5-4459-9877-D0B4040A942F}" destId="{187FEF15-EBD5-464D-9B77-65AF8814271C}" srcOrd="0" destOrd="0" presId="urn:microsoft.com/office/officeart/2005/8/layout/hierarchy4"/>
-    <dgm:cxn modelId="{CB4AB731-C79F-4CDB-90E1-AF81C0715B85}" type="presOf" srcId="{EBA3E750-9C02-4C9A-9FB5-167B90B55A46}" destId="{FE90592A-AD0A-422B-A991-F80FBA8C7C4B}" srcOrd="0" destOrd="0" presId="urn:microsoft.com/office/officeart/2005/8/layout/hierarchy4"/>
-    <dgm:cxn modelId="{8E9C31E9-487A-4C5F-B680-21A6D1A23727}" srcId="{3D2ACBF5-F895-435F-8B0D-3BFB52483093}" destId="{13789B58-14C3-4D26-B259-51AC0AE6C5B5}" srcOrd="0" destOrd="0" parTransId="{D35FFC3F-63D0-438B-B45E-9EE7E875C6B6}" sibTransId="{7B82688E-A779-4BE4-984F-CCF05CC1371C}"/>
-    <dgm:cxn modelId="{86CBDE9E-52D3-4977-AFB0-AC709336B22B}" type="presOf" srcId="{2E2CC210-63D3-4B90-AAB8-7842DC1ACF6A}" destId="{2414CDC9-2921-4E2E-9070-CB98C834D0AC}" srcOrd="0" destOrd="0" presId="urn:microsoft.com/office/officeart/2005/8/layout/hierarchy4"/>
-    <dgm:cxn modelId="{67E7B484-9983-46C3-91A6-FAF582152578}" srcId="{2E2CC210-63D3-4B90-AAB8-7842DC1ACF6A}" destId="{2CA60DA4-B62B-44AC-8281-22EFE8F6FFA9}" srcOrd="0" destOrd="0" parTransId="{85A89A3C-A2CB-46EE-9C5A-74BF445568EE}" sibTransId="{B03B81A3-9454-4A29-BA23-6B547BA5D9BA}"/>
-    <dgm:cxn modelId="{F147C648-872B-42E9-8A94-245B3DBBDC6A}" type="presOf" srcId="{13789B58-14C3-4D26-B259-51AC0AE6C5B5}" destId="{32C3FE91-8E77-40CC-AE92-C90F7E86F33A}" srcOrd="0" destOrd="0" presId="urn:microsoft.com/office/officeart/2005/8/layout/hierarchy4"/>
     <dgm:cxn modelId="{B538E310-4AC2-479D-B901-4EC25C5D7806}" srcId="{8132AD04-3B58-4986-8202-76FE1F021998}" destId="{2E2CC210-63D3-4B90-AAB8-7842DC1ACF6A}" srcOrd="0" destOrd="0" parTransId="{FB4296CD-CDE1-4D4D-9B92-BDAC471031FD}" sibTransId="{5A1345CB-7A71-49FC-A8AD-847A4E73DC5A}"/>
-    <dgm:cxn modelId="{A105A6C0-812E-4A65-AD38-91B09A99446C}" srcId="{2E2CC210-63D3-4B90-AAB8-7842DC1ACF6A}" destId="{EBA3E750-9C02-4C9A-9FB5-167B90B55A46}" srcOrd="1" destOrd="0" parTransId="{D3364096-3CD3-4DA5-A0C8-4A42280765AF}" sibTransId="{DADCB130-B4BF-43E0-8744-589B7798140C}"/>
-    <dgm:cxn modelId="{62918FE3-E699-4D9F-9B03-A51B81868E0A}" srcId="{CC4D3327-6D1C-4B10-BC36-95757644B5BA}" destId="{8132AD04-3B58-4986-8202-76FE1F021998}" srcOrd="0" destOrd="0" parTransId="{FB0691DA-C737-4893-A94A-5C8F5F8DC78F}" sibTransId="{0B66A5F2-B95F-4CE1-B33E-55CAACB1784F}"/>
+    <dgm:cxn modelId="{56205118-3548-4FAF-A22D-A862D594425D}" srcId="{8132AD04-3B58-4986-8202-76FE1F021998}" destId="{186E8C33-650E-44F0-8D93-2CA3816E561F}" srcOrd="1" destOrd="0" parTransId="{1C9090E9-E253-425C-97C8-854A16974FC4}" sibTransId="{D1299C69-B213-4DEF-9C0B-15D5FC0C921A}"/>
+    <dgm:cxn modelId="{A7A5547C-A857-42E8-9E3A-061F88B32B84}" srcId="{8132AD04-3B58-4986-8202-76FE1F021998}" destId="{3D2ACBF5-F895-435F-8B0D-3BFB52483093}" srcOrd="2" destOrd="0" parTransId="{5D95ED6B-3176-405C-A6EF-A6085F65E845}" sibTransId="{3A3DFEE2-BAE0-43F7-BA46-36C26AC410C5}"/>
     <dgm:cxn modelId="{9498D58A-EB8B-4B96-80C5-2DB322DF1733}" type="presParOf" srcId="{0B6E454E-EE7F-4039-A988-6D6C21FA1287}" destId="{4D8746FF-4C71-4726-80A1-AB0D28A035C4}" srcOrd="0" destOrd="0" presId="urn:microsoft.com/office/officeart/2005/8/layout/hierarchy4"/>
     <dgm:cxn modelId="{8AFF5C42-C35D-49F3-8B6A-883315FEF6D2}" type="presParOf" srcId="{4D8746FF-4C71-4726-80A1-AB0D28A035C4}" destId="{933F7C83-77B2-4FB5-9F91-493A35E5D989}" srcOrd="0" destOrd="0" presId="urn:microsoft.com/office/officeart/2005/8/layout/hierarchy4"/>
     <dgm:cxn modelId="{B95557FE-C650-49A9-AFB2-50E62D00C389}" type="presParOf" srcId="{4D8746FF-4C71-4726-80A1-AB0D28A035C4}" destId="{6FEF1076-F443-4FDC-9530-4C662107BE0F}" srcOrd="1" destOrd="0" presId="urn:microsoft.com/office/officeart/2005/8/layout/hierarchy4"/>
@@ -1508,15 +1585,19 @@
     <dgm:cxn modelId="{2840EA98-402D-46B1-8C5F-D4BFBAA47304}" type="presParOf" srcId="{0270A943-ED1A-4C05-BDA6-8B0CB186E39C}" destId="{FE90592A-AD0A-422B-A991-F80FBA8C7C4B}" srcOrd="0" destOrd="0" presId="urn:microsoft.com/office/officeart/2005/8/layout/hierarchy4"/>
     <dgm:cxn modelId="{EC85919E-F1AC-4853-93F4-F979B8E5E87B}" type="presParOf" srcId="{0270A943-ED1A-4C05-BDA6-8B0CB186E39C}" destId="{CB2060AE-3EED-420B-BC40-A4DFC28D3DEF}" srcOrd="1" destOrd="0" presId="urn:microsoft.com/office/officeart/2005/8/layout/hierarchy4"/>
     <dgm:cxn modelId="{A4BDBFCE-80A7-4AD2-BAF7-486250A6B3BD}" type="presParOf" srcId="{AD97B02B-B700-4DB2-93C5-73CB59F65865}" destId="{705F1670-E86B-4DBF-B02B-7B4A67955B07}" srcOrd="1" destOrd="0" presId="urn:microsoft.com/office/officeart/2005/8/layout/hierarchy4"/>
-    <dgm:cxn modelId="{0FFBF101-E3D1-4960-AC20-830043F0A57F}" type="presParOf" srcId="{AD97B02B-B700-4DB2-93C5-73CB59F65865}" destId="{7F27A5FD-ABBA-4E9E-9ED7-F1DFB7DA1C8B}" srcOrd="2" destOrd="0" presId="urn:microsoft.com/office/officeart/2005/8/layout/hierarchy4"/>
+    <dgm:cxn modelId="{71DC7F7B-CB31-471F-ADF5-6E23D19836B5}" type="presParOf" srcId="{AD97B02B-B700-4DB2-93C5-73CB59F65865}" destId="{71F6344C-7942-4C96-B11B-5786C7AC3AC6}" srcOrd="2" destOrd="0" presId="urn:microsoft.com/office/officeart/2005/8/layout/hierarchy4"/>
+    <dgm:cxn modelId="{E8B3B0EA-B1A3-4866-911C-4CAFF914D277}" type="presParOf" srcId="{71F6344C-7942-4C96-B11B-5786C7AC3AC6}" destId="{94084C15-33BE-47D4-9D1F-59A8BD253503}" srcOrd="0" destOrd="0" presId="urn:microsoft.com/office/officeart/2005/8/layout/hierarchy4"/>
+    <dgm:cxn modelId="{4894E8AB-F5A6-4725-9647-121DADAA6356}" type="presParOf" srcId="{71F6344C-7942-4C96-B11B-5786C7AC3AC6}" destId="{1DC0564F-23CF-410B-9ECB-56BC4B6E9788}" srcOrd="1" destOrd="0" presId="urn:microsoft.com/office/officeart/2005/8/layout/hierarchy4"/>
+    <dgm:cxn modelId="{B3FB2817-ACAC-4B46-BA5A-A3637DEA23FD}" type="presParOf" srcId="{71F6344C-7942-4C96-B11B-5786C7AC3AC6}" destId="{02155996-73FE-4D00-802D-651100894C97}" srcOrd="2" destOrd="0" presId="urn:microsoft.com/office/officeart/2005/8/layout/hierarchy4"/>
+    <dgm:cxn modelId="{DDEE7EA0-EC74-410F-AE1D-B0A829406D9B}" type="presParOf" srcId="{02155996-73FE-4D00-802D-651100894C97}" destId="{8369BBC2-E5D2-4760-BED9-FA7CA2BA7958}" srcOrd="0" destOrd="0" presId="urn:microsoft.com/office/officeart/2005/8/layout/hierarchy4"/>
+    <dgm:cxn modelId="{AF02D0EE-2388-4844-81B9-930B9FA8E70C}" type="presParOf" srcId="{8369BBC2-E5D2-4760-BED9-FA7CA2BA7958}" destId="{52CE305C-9711-4896-B4DA-5A91D003F4E3}" srcOrd="0" destOrd="0" presId="urn:microsoft.com/office/officeart/2005/8/layout/hierarchy4"/>
+    <dgm:cxn modelId="{706BAB85-1702-4373-9D8C-3EBD65BF8D99}" type="presParOf" srcId="{8369BBC2-E5D2-4760-BED9-FA7CA2BA7958}" destId="{FC7F97A3-DB29-4EAB-BED9-1C2AFE0EAB47}" srcOrd="1" destOrd="0" presId="urn:microsoft.com/office/officeart/2005/8/layout/hierarchy4"/>
+    <dgm:cxn modelId="{F5C989B4-661C-430E-AA12-C58DE5915542}" type="presParOf" srcId="{AD97B02B-B700-4DB2-93C5-73CB59F65865}" destId="{CA0985F6-2789-470C-9DD8-2901164088D8}" srcOrd="3" destOrd="0" presId="urn:microsoft.com/office/officeart/2005/8/layout/hierarchy4"/>
+    <dgm:cxn modelId="{0FFBF101-E3D1-4960-AC20-830043F0A57F}" type="presParOf" srcId="{AD97B02B-B700-4DB2-93C5-73CB59F65865}" destId="{7F27A5FD-ABBA-4E9E-9ED7-F1DFB7DA1C8B}" srcOrd="4" destOrd="0" presId="urn:microsoft.com/office/officeart/2005/8/layout/hierarchy4"/>
     <dgm:cxn modelId="{E76E39D7-5755-4CF9-90DF-FC6888EA799E}" type="presParOf" srcId="{7F27A5FD-ABBA-4E9E-9ED7-F1DFB7DA1C8B}" destId="{258044DB-E7CF-4021-8E8A-D08D977E6DAE}" srcOrd="0" destOrd="0" presId="urn:microsoft.com/office/officeart/2005/8/layout/hierarchy4"/>
     <dgm:cxn modelId="{9E83EC5A-E9EA-402B-AD03-19BE6F2EC289}" type="presParOf" srcId="{7F27A5FD-ABBA-4E9E-9ED7-F1DFB7DA1C8B}" destId="{CDBD5C70-E020-4B86-9FCB-934B58828B3C}" srcOrd="1" destOrd="0" presId="urn:microsoft.com/office/officeart/2005/8/layout/hierarchy4"/>
     <dgm:cxn modelId="{5F19E330-ECCC-4F99-B0BF-ECC10CB63272}" type="presParOf" srcId="{7F27A5FD-ABBA-4E9E-9ED7-F1DFB7DA1C8B}" destId="{640864CA-ACA8-4228-ACA0-D808EA6C4F3A}" srcOrd="2" destOrd="0" presId="urn:microsoft.com/office/officeart/2005/8/layout/hierarchy4"/>
-    <dgm:cxn modelId="{A71D1CA4-9C97-4141-A0B2-D0A0A83191A9}" type="presParOf" srcId="{640864CA-ACA8-4228-ACA0-D808EA6C4F3A}" destId="{E919F72D-E800-4404-9E84-2C747B681947}" srcOrd="0" destOrd="0" presId="urn:microsoft.com/office/officeart/2005/8/layout/hierarchy4"/>
-    <dgm:cxn modelId="{197D7436-04DA-4355-BD26-DD7369D8646D}" type="presParOf" srcId="{E919F72D-E800-4404-9E84-2C747B681947}" destId="{32C3FE91-8E77-40CC-AE92-C90F7E86F33A}" srcOrd="0" destOrd="0" presId="urn:microsoft.com/office/officeart/2005/8/layout/hierarchy4"/>
-    <dgm:cxn modelId="{CC7EA380-ACDB-4EA6-906E-FAED26410432}" type="presParOf" srcId="{E919F72D-E800-4404-9E84-2C747B681947}" destId="{31CF5BE0-CCF3-46C1-BA02-BB7EDBF3B423}" srcOrd="1" destOrd="0" presId="urn:microsoft.com/office/officeart/2005/8/layout/hierarchy4"/>
-    <dgm:cxn modelId="{5407D717-4467-48F5-AE30-505F167DE3C1}" type="presParOf" srcId="{640864CA-ACA8-4228-ACA0-D808EA6C4F3A}" destId="{5AF86458-B0CB-45CA-9F5B-849A2F5D0D76}" srcOrd="1" destOrd="0" presId="urn:microsoft.com/office/officeart/2005/8/layout/hierarchy4"/>
-    <dgm:cxn modelId="{A1BB41DD-A29D-45B9-8A87-D00D4DCF5CC6}" type="presParOf" srcId="{640864CA-ACA8-4228-ACA0-D808EA6C4F3A}" destId="{FAB6C358-62FF-4E59-B8D7-85F3882283CD}" srcOrd="2" destOrd="0" presId="urn:microsoft.com/office/officeart/2005/8/layout/hierarchy4"/>
+    <dgm:cxn modelId="{A1BB41DD-A29D-45B9-8A87-D00D4DCF5CC6}" type="presParOf" srcId="{640864CA-ACA8-4228-ACA0-D808EA6C4F3A}" destId="{FAB6C358-62FF-4E59-B8D7-85F3882283CD}" srcOrd="0" destOrd="0" presId="urn:microsoft.com/office/officeart/2005/8/layout/hierarchy4"/>
     <dgm:cxn modelId="{E2A53E64-D28E-474B-980D-C9F1115167B0}" type="presParOf" srcId="{FAB6C358-62FF-4E59-B8D7-85F3882283CD}" destId="{187FEF15-EBD5-464D-9B77-65AF8814271C}" srcOrd="0" destOrd="0" presId="urn:microsoft.com/office/officeart/2005/8/layout/hierarchy4"/>
     <dgm:cxn modelId="{B060F23C-3A01-41FF-B020-FC2C3F7C9D76}" type="presParOf" srcId="{FAB6C358-62FF-4E59-B8D7-85F3882283CD}" destId="{373E4697-A2E8-40E4-B24F-44711B5CEB41}" srcOrd="1" destOrd="0" presId="urn:microsoft.com/office/officeart/2005/8/layout/hierarchy4"/>
   </dgm:cxnLst>
@@ -1545,8 +1626,8 @@
       </dsp:nvSpPr>
       <dsp:spPr>
         <a:xfrm>
-          <a:off x="2250" y="1460"/>
-          <a:ext cx="6091499" cy="1281906"/>
+          <a:off x="2944" y="2392"/>
+          <a:ext cx="6210463" cy="1402396"/>
         </a:xfrm>
         <a:prstGeom prst="roundRect">
           <a:avLst>
@@ -1589,12 +1670,12 @@
         </a:fontRef>
       </dsp:style>
       <dsp:txBody>
-        <a:bodyPr spcFirstLastPara="0" vert="horz" wrap="square" lIns="110490" tIns="110490" rIns="110490" bIns="110490" numCol="1" spcCol="1270" anchor="ctr" anchorCtr="0">
+        <a:bodyPr spcFirstLastPara="0" vert="horz" wrap="square" lIns="106680" tIns="106680" rIns="106680" bIns="106680" numCol="1" spcCol="1270" anchor="ctr" anchorCtr="0">
           <a:noAutofit/>
         </a:bodyPr>
         <a:lstStyle/>
         <a:p>
-          <a:pPr lvl="0" algn="ctr" defTabSz="1289050">
+          <a:pPr lvl="0" algn="ctr" defTabSz="1244600">
             <a:lnSpc>
               <a:spcPct val="90000"/>
             </a:lnSpc>
@@ -1606,12 +1687,12 @@
             </a:spcAft>
           </a:pPr>
           <a:r>
-            <a:rPr lang="es-AR" sz="2900" kern="1200" dirty="0" smtClean="0"/>
+            <a:rPr lang="es-AR" sz="2800" kern="1200" dirty="0" smtClean="0"/>
             <a:t>Entidades de Dominio</a:t>
           </a:r>
         </a:p>
         <a:p>
-          <a:pPr lvl="0" algn="ctr" defTabSz="1289050">
+          <a:pPr lvl="0" algn="ctr" defTabSz="1244600">
             <a:lnSpc>
               <a:spcPct val="90000"/>
             </a:lnSpc>
@@ -1634,12 +1715,12 @@
             <a:rPr lang="es-AR" sz="2400" i="1" kern="1200" dirty="0" smtClean="0"/>
             <a:t>, Articulo, etc.)</a:t>
           </a:r>
-          <a:endParaRPr lang="es-AR" sz="2900" i="1" kern="1200" dirty="0"/>
+          <a:endParaRPr lang="es-AR" sz="2800" i="1" kern="1200" dirty="0"/>
         </a:p>
       </dsp:txBody>
       <dsp:txXfrm>
-        <a:off x="39796" y="39006"/>
-        <a:ext cx="6016407" cy="1206814"/>
+        <a:off x="44019" y="43467"/>
+        <a:ext cx="6128313" cy="1320246"/>
       </dsp:txXfrm>
     </dsp:sp>
     <dsp:sp modelId="{2414CDC9-2921-4E2E-9070-CB98C834D0AC}">
@@ -1649,8 +1730,8 @@
       </dsp:nvSpPr>
       <dsp:spPr>
         <a:xfrm>
-          <a:off x="2250" y="1391046"/>
-          <a:ext cx="2984367" cy="1281906"/>
+          <a:off x="2944" y="1514935"/>
+          <a:ext cx="3012296" cy="1402396"/>
         </a:xfrm>
         <a:prstGeom prst="roundRect">
           <a:avLst>
@@ -1693,12 +1774,12 @@
         </a:fontRef>
       </dsp:style>
       <dsp:txBody>
-        <a:bodyPr spcFirstLastPara="0" vert="horz" wrap="square" lIns="102870" tIns="102870" rIns="102870" bIns="102870" numCol="1" spcCol="1270" anchor="ctr" anchorCtr="0">
+        <a:bodyPr spcFirstLastPara="0" vert="horz" wrap="square" lIns="76200" tIns="76200" rIns="76200" bIns="76200" numCol="1" spcCol="1270" anchor="ctr" anchorCtr="0">
           <a:noAutofit/>
         </a:bodyPr>
         <a:lstStyle/>
         <a:p>
-          <a:pPr lvl="0" algn="ctr" defTabSz="1200150">
+          <a:pPr lvl="0" algn="ctr" defTabSz="889000">
             <a:lnSpc>
               <a:spcPct val="90000"/>
             </a:lnSpc>
@@ -1710,15 +1791,15 @@
             </a:spcAft>
           </a:pPr>
           <a:r>
-            <a:rPr lang="es-AR" sz="2700" kern="1200" dirty="0" err="1" smtClean="0"/>
+            <a:rPr lang="es-AR" sz="2000" kern="1200" dirty="0" err="1" smtClean="0"/>
             <a:t>despacho.backend</a:t>
           </a:r>
-          <a:endParaRPr lang="es-AR" sz="2700" kern="1200" dirty="0"/>
+          <a:endParaRPr lang="es-AR" sz="2000" kern="1200" dirty="0"/>
         </a:p>
       </dsp:txBody>
       <dsp:txXfrm>
-        <a:off x="39796" y="1428592"/>
-        <a:ext cx="2909275" cy="1206814"/>
+        <a:off x="44019" y="1556010"/>
+        <a:ext cx="2930146" cy="1320246"/>
       </dsp:txXfrm>
     </dsp:sp>
     <dsp:sp modelId="{FC682755-238F-42BD-B24F-5A4B1AD1977B}">
@@ -1728,8 +1809,8 @@
       </dsp:nvSpPr>
       <dsp:spPr>
         <a:xfrm>
-          <a:off x="2250" y="2780633"/>
-          <a:ext cx="1461492" cy="1281906"/>
+          <a:off x="2944" y="3027477"/>
+          <a:ext cx="1475169" cy="1402396"/>
         </a:xfrm>
         <a:prstGeom prst="roundRect">
           <a:avLst>
@@ -1837,8 +1918,8 @@
         </a:p>
       </dsp:txBody>
       <dsp:txXfrm>
-        <a:off x="39796" y="2818179"/>
-        <a:ext cx="1386400" cy="1206814"/>
+        <a:off x="44019" y="3068552"/>
+        <a:ext cx="1393019" cy="1320246"/>
       </dsp:txXfrm>
     </dsp:sp>
     <dsp:sp modelId="{FE90592A-AD0A-422B-A991-F80FBA8C7C4B}">
@@ -1848,8 +1929,8 @@
       </dsp:nvSpPr>
       <dsp:spPr>
         <a:xfrm>
-          <a:off x="1525125" y="2780633"/>
-          <a:ext cx="1461492" cy="1281906"/>
+          <a:off x="1540070" y="3027477"/>
+          <a:ext cx="1475169" cy="1402396"/>
         </a:xfrm>
         <a:prstGeom prst="roundRect">
           <a:avLst>
@@ -1965,19 +2046,19 @@
         </a:p>
       </dsp:txBody>
       <dsp:txXfrm>
-        <a:off x="1562671" y="2818179"/>
-        <a:ext cx="1386400" cy="1206814"/>
+        <a:off x="1581145" y="3068552"/>
+        <a:ext cx="1393019" cy="1320246"/>
       </dsp:txXfrm>
     </dsp:sp>
-    <dsp:sp modelId="{258044DB-E7CF-4021-8E8A-D08D977E6DAE}">
+    <dsp:sp modelId="{94084C15-33BE-47D4-9D1F-59A8BD253503}">
       <dsp:nvSpPr>
         <dsp:cNvPr id="0" name=""/>
         <dsp:cNvSpPr/>
       </dsp:nvSpPr>
       <dsp:spPr>
         <a:xfrm>
-          <a:off x="3109382" y="1391046"/>
-          <a:ext cx="2984367" cy="1281906"/>
+          <a:off x="3139154" y="1514935"/>
+          <a:ext cx="1475169" cy="1402396"/>
         </a:xfrm>
         <a:prstGeom prst="roundRect">
           <a:avLst>
@@ -2020,12 +2101,12 @@
         </a:fontRef>
       </dsp:style>
       <dsp:txBody>
-        <a:bodyPr spcFirstLastPara="0" vert="horz" wrap="square" lIns="102870" tIns="102870" rIns="102870" bIns="102870" numCol="1" spcCol="1270" anchor="ctr" anchorCtr="0">
+        <a:bodyPr spcFirstLastPara="0" vert="horz" wrap="square" lIns="76200" tIns="76200" rIns="76200" bIns="76200" numCol="1" spcCol="1270" anchor="ctr" anchorCtr="0">
           <a:noAutofit/>
         </a:bodyPr>
         <a:lstStyle/>
         <a:p>
-          <a:pPr lvl="0" algn="ctr" defTabSz="1200150">
+          <a:pPr lvl="0" algn="ctr" defTabSz="889000">
             <a:lnSpc>
               <a:spcPct val="90000"/>
             </a:lnSpc>
@@ -2037,26 +2118,26 @@
             </a:spcAft>
           </a:pPr>
           <a:r>
-            <a:rPr lang="es-AR" sz="2700" kern="1200" dirty="0" err="1" smtClean="0"/>
-            <a:t>despacho.web</a:t>
+            <a:rPr lang="es-AR" sz="2000" kern="1200" dirty="0" err="1" smtClean="0"/>
+            <a:t>despacho.backend.api</a:t>
           </a:r>
-          <a:endParaRPr lang="es-AR" sz="2700" kern="1200" dirty="0"/>
+          <a:endParaRPr lang="es-AR" sz="2000" kern="1200" dirty="0"/>
         </a:p>
       </dsp:txBody>
       <dsp:txXfrm>
-        <a:off x="3146928" y="1428592"/>
-        <a:ext cx="2909275" cy="1206814"/>
+        <a:off x="3180229" y="1556010"/>
+        <a:ext cx="1393019" cy="1320246"/>
       </dsp:txXfrm>
     </dsp:sp>
-    <dsp:sp modelId="{32C3FE91-8E77-40CC-AE92-C90F7E86F33A}">
+    <dsp:sp modelId="{52CE305C-9711-4896-B4DA-5A91D003F4E3}">
       <dsp:nvSpPr>
         <dsp:cNvPr id="0" name=""/>
         <dsp:cNvSpPr/>
       </dsp:nvSpPr>
       <dsp:spPr>
         <a:xfrm>
-          <a:off x="3109382" y="2780633"/>
-          <a:ext cx="1461492" cy="1281906"/>
+          <a:off x="3139154" y="3027477"/>
+          <a:ext cx="1475169" cy="1402396"/>
         </a:xfrm>
         <a:prstGeom prst="roundRect">
           <a:avLst>
@@ -2123,12 +2204,95 @@
             <a:rPr lang="es-AR" sz="1400" b="1" kern="1200" dirty="0" smtClean="0"/>
             <a:t> REST</a:t>
           </a:r>
-          <a:endParaRPr lang="es-AR" sz="1400" b="1" kern="1200" dirty="0"/>
+          <a:r>
+            <a:rPr lang="es-AR" sz="1400" kern="1200" dirty="0" smtClean="0"/>
+            <a:t> (JSON)</a:t>
+          </a:r>
+          <a:endParaRPr lang="es-AR" sz="1400" kern="1200" dirty="0"/>
         </a:p>
       </dsp:txBody>
       <dsp:txXfrm>
-        <a:off x="3146928" y="2818179"/>
-        <a:ext cx="1386400" cy="1206814"/>
+        <a:off x="3180229" y="3068552"/>
+        <a:ext cx="1393019" cy="1320246"/>
+      </dsp:txXfrm>
+    </dsp:sp>
+    <dsp:sp modelId="{258044DB-E7CF-4021-8E8A-D08D977E6DAE}">
+      <dsp:nvSpPr>
+        <dsp:cNvPr id="0" name=""/>
+        <dsp:cNvSpPr/>
+      </dsp:nvSpPr>
+      <dsp:spPr>
+        <a:xfrm>
+          <a:off x="4738238" y="1514935"/>
+          <a:ext cx="1475169" cy="1402396"/>
+        </a:xfrm>
+        <a:prstGeom prst="roundRect">
+          <a:avLst>
+            <a:gd name="adj" fmla="val 10000"/>
+          </a:avLst>
+        </a:prstGeom>
+        <a:solidFill>
+          <a:schemeClr val="accent4">
+            <a:hueOff val="0"/>
+            <a:satOff val="0"/>
+            <a:lumOff val="0"/>
+            <a:alphaOff val="0"/>
+          </a:schemeClr>
+        </a:solidFill>
+        <a:ln w="25400" cap="flat" cmpd="sng" algn="ctr">
+          <a:solidFill>
+            <a:schemeClr val="lt1">
+              <a:hueOff val="0"/>
+              <a:satOff val="0"/>
+              <a:lumOff val="0"/>
+              <a:alphaOff val="0"/>
+            </a:schemeClr>
+          </a:solidFill>
+          <a:prstDash val="solid"/>
+        </a:ln>
+        <a:effectLst/>
+      </dsp:spPr>
+      <dsp:style>
+        <a:lnRef idx="2">
+          <a:scrgbClr r="0" g="0" b="0"/>
+        </a:lnRef>
+        <a:fillRef idx="1">
+          <a:scrgbClr r="0" g="0" b="0"/>
+        </a:fillRef>
+        <a:effectRef idx="0">
+          <a:scrgbClr r="0" g="0" b="0"/>
+        </a:effectRef>
+        <a:fontRef idx="minor">
+          <a:schemeClr val="lt1"/>
+        </a:fontRef>
+      </dsp:style>
+      <dsp:txBody>
+        <a:bodyPr spcFirstLastPara="0" vert="horz" wrap="square" lIns="76200" tIns="76200" rIns="76200" bIns="76200" numCol="1" spcCol="1270" anchor="ctr" anchorCtr="0">
+          <a:noAutofit/>
+        </a:bodyPr>
+        <a:lstStyle/>
+        <a:p>
+          <a:pPr lvl="0" algn="ctr" defTabSz="889000">
+            <a:lnSpc>
+              <a:spcPct val="90000"/>
+            </a:lnSpc>
+            <a:spcBef>
+              <a:spcPct val="0"/>
+            </a:spcBef>
+            <a:spcAft>
+              <a:spcPct val="35000"/>
+            </a:spcAft>
+          </a:pPr>
+          <a:r>
+            <a:rPr lang="es-AR" sz="2000" kern="1200" dirty="0" err="1" smtClean="0"/>
+            <a:t>despacho.web</a:t>
+          </a:r>
+          <a:endParaRPr lang="es-AR" sz="2000" kern="1200" dirty="0"/>
+        </a:p>
+      </dsp:txBody>
+      <dsp:txXfrm>
+        <a:off x="4779313" y="1556010"/>
+        <a:ext cx="1393019" cy="1320246"/>
       </dsp:txXfrm>
     </dsp:sp>
     <dsp:sp modelId="{187FEF15-EBD5-464D-9B77-65AF8814271C}">
@@ -2138,8 +2302,8 @@
       </dsp:nvSpPr>
       <dsp:spPr>
         <a:xfrm>
-          <a:off x="4632257" y="2780633"/>
-          <a:ext cx="1461492" cy="1281906"/>
+          <a:off x="4738238" y="3027477"/>
+          <a:ext cx="1475169" cy="1402396"/>
         </a:xfrm>
         <a:prstGeom prst="roundRect">
           <a:avLst>
@@ -2247,8 +2411,8 @@
         </a:p>
       </dsp:txBody>
       <dsp:txXfrm>
-        <a:off x="4669803" y="2818179"/>
-        <a:ext cx="1386400" cy="1206814"/>
+        <a:off x="4779313" y="3068552"/>
+        <a:ext cx="1393019" cy="1320246"/>
       </dsp:txXfrm>
     </dsp:sp>
   </dsp:spTree>
@@ -3992,7 +4156,7 @@
           <a:p>
             <a:fld id="{B9088268-BAD1-4451-98C5-7622467FC80C}" type="datetimeFigureOut">
               <a:rPr lang="es-AR" smtClean="0"/>
-              <a:t>10/11/2013</a:t>
+              <a:t>16/11/2013</a:t>
             </a:fld>
             <a:endParaRPr lang="es-AR"/>
           </a:p>
@@ -4162,7 +4326,7 @@
           <a:p>
             <a:fld id="{B9088268-BAD1-4451-98C5-7622467FC80C}" type="datetimeFigureOut">
               <a:rPr lang="es-AR" smtClean="0"/>
-              <a:t>10/11/2013</a:t>
+              <a:t>16/11/2013</a:t>
             </a:fld>
             <a:endParaRPr lang="es-AR"/>
           </a:p>
@@ -4342,7 +4506,7 @@
           <a:p>
             <a:fld id="{B9088268-BAD1-4451-98C5-7622467FC80C}" type="datetimeFigureOut">
               <a:rPr lang="es-AR" smtClean="0"/>
-              <a:t>10/11/2013</a:t>
+              <a:t>16/11/2013</a:t>
             </a:fld>
             <a:endParaRPr lang="es-AR"/>
           </a:p>
@@ -4512,7 +4676,7 @@
           <a:p>
             <a:fld id="{B9088268-BAD1-4451-98C5-7622467FC80C}" type="datetimeFigureOut">
               <a:rPr lang="es-AR" smtClean="0"/>
-              <a:t>10/11/2013</a:t>
+              <a:t>16/11/2013</a:t>
             </a:fld>
             <a:endParaRPr lang="es-AR"/>
           </a:p>
@@ -4758,7 +4922,7 @@
           <a:p>
             <a:fld id="{B9088268-BAD1-4451-98C5-7622467FC80C}" type="datetimeFigureOut">
               <a:rPr lang="es-AR" smtClean="0"/>
-              <a:t>10/11/2013</a:t>
+              <a:t>16/11/2013</a:t>
             </a:fld>
             <a:endParaRPr lang="es-AR"/>
           </a:p>
@@ -5046,7 +5210,7 @@
           <a:p>
             <a:fld id="{B9088268-BAD1-4451-98C5-7622467FC80C}" type="datetimeFigureOut">
               <a:rPr lang="es-AR" smtClean="0"/>
-              <a:t>10/11/2013</a:t>
+              <a:t>16/11/2013</a:t>
             </a:fld>
             <a:endParaRPr lang="es-AR"/>
           </a:p>
@@ -5468,7 +5632,7 @@
           <a:p>
             <a:fld id="{B9088268-BAD1-4451-98C5-7622467FC80C}" type="datetimeFigureOut">
               <a:rPr lang="es-AR" smtClean="0"/>
-              <a:t>10/11/2013</a:t>
+              <a:t>16/11/2013</a:t>
             </a:fld>
             <a:endParaRPr lang="es-AR"/>
           </a:p>
@@ -5586,7 +5750,7 @@
           <a:p>
             <a:fld id="{B9088268-BAD1-4451-98C5-7622467FC80C}" type="datetimeFigureOut">
               <a:rPr lang="es-AR" smtClean="0"/>
-              <a:t>10/11/2013</a:t>
+              <a:t>16/11/2013</a:t>
             </a:fld>
             <a:endParaRPr lang="es-AR"/>
           </a:p>
@@ -5681,7 +5845,7 @@
           <a:p>
             <a:fld id="{B9088268-BAD1-4451-98C5-7622467FC80C}" type="datetimeFigureOut">
               <a:rPr lang="es-AR" smtClean="0"/>
-              <a:t>10/11/2013</a:t>
+              <a:t>16/11/2013</a:t>
             </a:fld>
             <a:endParaRPr lang="es-AR"/>
           </a:p>
@@ -5958,7 +6122,7 @@
           <a:p>
             <a:fld id="{B9088268-BAD1-4451-98C5-7622467FC80C}" type="datetimeFigureOut">
               <a:rPr lang="es-AR" smtClean="0"/>
-              <a:t>10/11/2013</a:t>
+              <a:t>16/11/2013</a:t>
             </a:fld>
             <a:endParaRPr lang="es-AR"/>
           </a:p>
@@ -6211,7 +6375,7 @@
           <a:p>
             <a:fld id="{B9088268-BAD1-4451-98C5-7622467FC80C}" type="datetimeFigureOut">
               <a:rPr lang="es-AR" smtClean="0"/>
-              <a:t>10/11/2013</a:t>
+              <a:t>16/11/2013</a:t>
             </a:fld>
             <a:endParaRPr lang="es-AR"/>
           </a:p>
@@ -6424,7 +6588,7 @@
           <a:p>
             <a:fld id="{B9088268-BAD1-4451-98C5-7622467FC80C}" type="datetimeFigureOut">
               <a:rPr lang="es-AR" smtClean="0"/>
-              <a:t>10/11/2013</a:t>
+              <a:t>16/11/2013</a:t>
             </a:fld>
             <a:endParaRPr lang="es-AR"/>
           </a:p>
@@ -6806,14 +6970,14 @@
           <p:nvPr>
             <p:extLst>
               <p:ext uri="{D42A27DB-BD31-4B8C-83A1-F6EECF244321}">
-                <p14:modId xmlns:p14="http://schemas.microsoft.com/office/powerpoint/2010/main" val="1493282035"/>
+                <p14:modId xmlns:p14="http://schemas.microsoft.com/office/powerpoint/2010/main" val="3149709810"/>
               </p:ext>
             </p:extLst>
           </p:nvPr>
         </p:nvGraphicFramePr>
         <p:xfrm>
-          <a:off x="1524000" y="1397000"/>
-          <a:ext cx="6096000" cy="4064000"/>
+          <a:off x="1259632" y="1412776"/>
+          <a:ext cx="6216352" cy="4432267"/>
         </p:xfrm>
         <a:graphic>
           <a:graphicData uri="http://schemas.openxmlformats.org/drawingml/2006/diagram">

</xml_diff>